<commit_message>
Added ppt file for the week 3 presentation.
</commit_message>
<xml_diff>
--- a/presentations/g1_presentation_01.pptx
+++ b/presentations/g1_presentation_01.pptx
@@ -3992,17 +3992,7 @@
                   </a:schemeClr>
                 </a:solidFill>
               </a:rPr>
-              <a:t>Progress </a:t>
-            </a:r>
-            <a:r>
-              <a:rPr lang="en-NZ" dirty="0" smtClean="0">
-                <a:solidFill>
-                  <a:schemeClr val="bg1">
-                    <a:lumMod val="75000"/>
-                  </a:schemeClr>
-                </a:solidFill>
-              </a:rPr>
-              <a:t>Update</a:t>
+              <a:t>Progress Update</a:t>
             </a:r>
           </a:p>
           <a:p>
@@ -4084,15 +4074,7 @@
                   <a:schemeClr val="bg1"/>
                 </a:solidFill>
               </a:rPr>
-              <a:t>Organisational </a:t>
-            </a:r>
-            <a:r>
-              <a:rPr lang="en-NZ" dirty="0" smtClean="0">
-                <a:solidFill>
-                  <a:schemeClr val="bg1"/>
-                </a:solidFill>
-              </a:rPr>
-              <a:t>Structure</a:t>
+              <a:t>Organisational Structure</a:t>
             </a:r>
             <a:endParaRPr lang="en-NZ" dirty="0">
               <a:solidFill>
@@ -4364,7 +4346,7 @@
         </p:nvSpPr>
         <p:spPr>
           <a:xfrm>
-            <a:off x="4216936" y="3141836"/>
+            <a:off x="4196110" y="3141836"/>
             <a:ext cx="1688154" cy="646331"/>
           </a:xfrm>
           <a:prstGeom prst="rect">
@@ -5224,21 +5206,8 @@
                   <a:schemeClr val="bg1"/>
                 </a:solidFill>
               </a:rPr>
-              <a:t>Requirements </a:t>
-            </a:r>
-            <a:r>
-              <a:rPr lang="en-NZ" dirty="0" smtClean="0">
-                <a:solidFill>
-                  <a:schemeClr val="bg1"/>
-                </a:solidFill>
-              </a:rPr>
-              <a:t>Analysis</a:t>
-            </a:r>
-            <a:endParaRPr lang="en-NZ" dirty="0" smtClean="0">
-              <a:solidFill>
-                <a:schemeClr val="bg1"/>
-              </a:solidFill>
-            </a:endParaRPr>
+              <a:t>Requirements Analysis</a:t>
+            </a:r>
           </a:p>
         </p:txBody>
       </p:sp>
@@ -5425,15 +5394,7 @@
                     <a:schemeClr val="bg1"/>
                   </a:solidFill>
                 </a:rPr>
-                <a:t>Create </a:t>
-              </a:r>
-              <a:r>
-                <a:rPr lang="en-NZ" dirty="0" smtClean="0">
-                  <a:solidFill>
-                    <a:schemeClr val="bg1"/>
-                  </a:solidFill>
-                </a:rPr>
-                <a:t>Project </a:t>
+                <a:t>Create Project </a:t>
               </a:r>
               <a:r>
                 <a:rPr lang="en-NZ" dirty="0">
@@ -5451,11 +5412,6 @@
                 </a:rPr>
                 <a:t>lan</a:t>
               </a:r>
-              <a:endParaRPr lang="en-NZ" dirty="0" smtClean="0">
-                <a:solidFill>
-                  <a:schemeClr val="bg1"/>
-                </a:solidFill>
-              </a:endParaRPr>
             </a:p>
           </p:txBody>
         </p:sp>
@@ -5687,21 +5643,8 @@
                     <a:schemeClr val="bg1"/>
                   </a:solidFill>
                 </a:rPr>
-                <a:t>Alpha </a:t>
+                <a:t>Alpha Release</a:t>
               </a:r>
-              <a:r>
-                <a:rPr lang="en-NZ" dirty="0" smtClean="0">
-                  <a:solidFill>
-                    <a:schemeClr val="bg1"/>
-                  </a:solidFill>
-                </a:rPr>
-                <a:t>Release</a:t>
-              </a:r>
-              <a:endParaRPr lang="en-NZ" dirty="0" smtClean="0">
-                <a:solidFill>
-                  <a:schemeClr val="bg1"/>
-                </a:solidFill>
-              </a:endParaRPr>
             </a:p>
           </p:txBody>
         </p:sp>
@@ -5997,7 +5940,7 @@
             </a:r>
             <a:r>
               <a:rPr lang="en-NZ" sz="2800" dirty="0" smtClean="0"/>
-              <a:t>Familiarization</a:t>
+              <a:t>Familiarisation</a:t>
             </a:r>
             <a:endParaRPr lang="en-NZ" sz="2800" dirty="0"/>
           </a:p>

</xml_diff>